<commit_message>
#4 Added theory to desp
</commit_message>
<xml_diff>
--- a/DESP/TCPIP-OSIpptx.pptx
+++ b/DESP/TCPIP-OSIpptx.pptx
@@ -238,7 +238,7 @@
             <a:pPr rtl="0"/>
             <a:fld id="{A081329F-7CE5-493C-8708-DFD7D8695740}" type="datetime1">
               <a:rPr lang="es-ES" smtClean="0"/>
-              <a:t>07/10/2021</a:t>
+              <a:t>13/10/2021</a:t>
             </a:fld>
             <a:endParaRPr lang="es-ES"/>
           </a:p>
@@ -408,7 +408,7 @@
             <a:pPr rtl="0"/>
             <a:fld id="{AFE3043F-1867-4CF1-8D54-D5B567932F3A}" type="datetime1">
               <a:rPr lang="es-ES" noProof="0" smtClean="0"/>
-              <a:t>07/10/2021</a:t>
+              <a:t>13/10/2021</a:t>
             </a:fld>
             <a:endParaRPr lang="es-ES" noProof="0"/>
           </a:p>
@@ -897,7 +897,7 @@
             <a:pPr rtl="0"/>
             <a:fld id="{52D56EB4-DFDA-4CC1-93CC-AD4B6617F5E1}" type="datetime1">
               <a:rPr lang="es-ES" noProof="0" smtClean="0"/>
-              <a:t>07/10/2021</a:t>
+              <a:t>13/10/2021</a:t>
             </a:fld>
             <a:endParaRPr lang="es-ES" noProof="0"/>
           </a:p>
@@ -1070,7 +1070,7 @@
             <a:pPr rtl="0"/>
             <a:fld id="{27032562-B72C-4BFB-88F1-64644BE16903}" type="datetime1">
               <a:rPr lang="es-ES" noProof="0" smtClean="0"/>
-              <a:t>07/10/2021</a:t>
+              <a:t>13/10/2021</a:t>
             </a:fld>
             <a:endParaRPr lang="es-ES" noProof="0"/>
           </a:p>
@@ -1253,7 +1253,7 @@
             <a:pPr rtl="0"/>
             <a:fld id="{B50BB613-3DBB-4AF0-BF43-54F9B27913AD}" type="datetime1">
               <a:rPr lang="es-ES" noProof="0" smtClean="0"/>
-              <a:t>07/10/2021</a:t>
+              <a:t>13/10/2021</a:t>
             </a:fld>
             <a:endParaRPr lang="es-ES" noProof="0"/>
           </a:p>
@@ -1426,7 +1426,7 @@
             <a:pPr rtl="0"/>
             <a:fld id="{50FAE98D-1BA9-4C5C-9B9D-02D05A67A03F}" type="datetime1">
               <a:rPr lang="es-ES" noProof="0" smtClean="0"/>
-              <a:t>07/10/2021</a:t>
+              <a:t>13/10/2021</a:t>
             </a:fld>
             <a:endParaRPr lang="es-ES" noProof="0" dirty="0"/>
           </a:p>
@@ -1677,7 +1677,7 @@
             <a:pPr rtl="0"/>
             <a:fld id="{CD67D1CC-ED81-4608-8477-107B98FD71DB}" type="datetime1">
               <a:rPr lang="es-ES" noProof="0" smtClean="0"/>
-              <a:t>07/10/2021</a:t>
+              <a:t>13/10/2021</a:t>
             </a:fld>
             <a:endParaRPr lang="es-ES" noProof="0"/>
           </a:p>
@@ -1912,7 +1912,7 @@
             <a:pPr rtl="0"/>
             <a:fld id="{E46C4943-B6FF-4246-9D08-A32B1B9D1263}" type="datetime1">
               <a:rPr lang="es-ES" noProof="0" smtClean="0"/>
-              <a:t>07/10/2021</a:t>
+              <a:t>13/10/2021</a:t>
             </a:fld>
             <a:endParaRPr lang="es-ES" noProof="0"/>
           </a:p>
@@ -2282,7 +2282,7 @@
             <a:pPr rtl="0"/>
             <a:fld id="{A3634AF6-F32B-40FC-8CB5-FDA3FF1B997D}" type="datetime1">
               <a:rPr lang="es-ES" noProof="0" smtClean="0"/>
-              <a:t>07/10/2021</a:t>
+              <a:t>13/10/2021</a:t>
             </a:fld>
             <a:endParaRPr lang="es-ES" noProof="0"/>
           </a:p>
@@ -2403,7 +2403,7 @@
             <a:pPr rtl="0"/>
             <a:fld id="{D17D2C3C-967C-47F3-9518-1C55033A4190}" type="datetime1">
               <a:rPr lang="es-ES" noProof="0" smtClean="0"/>
-              <a:t>07/10/2021</a:t>
+              <a:t>13/10/2021</a:t>
             </a:fld>
             <a:endParaRPr lang="es-ES" noProof="0"/>
           </a:p>
@@ -2501,7 +2501,7 @@
             <a:pPr rtl="0"/>
             <a:fld id="{E5816D70-8C13-4B5C-AD6A-1B6419EBD6E9}" type="datetime1">
               <a:rPr lang="es-ES" noProof="0" smtClean="0"/>
-              <a:t>07/10/2021</a:t>
+              <a:t>13/10/2021</a:t>
             </a:fld>
             <a:endParaRPr lang="es-ES" noProof="0"/>
           </a:p>
@@ -2781,7 +2781,7 @@
             <a:pPr rtl="0"/>
             <a:fld id="{6FEAA116-0A87-491F-91A5-A61CE936B1E8}" type="datetime1">
               <a:rPr lang="es-ES" noProof="0" smtClean="0"/>
-              <a:t>07/10/2021</a:t>
+              <a:t>13/10/2021</a:t>
             </a:fld>
             <a:endParaRPr lang="es-ES" noProof="0"/>
           </a:p>
@@ -3037,7 +3037,7 @@
             <a:pPr rtl="0"/>
             <a:fld id="{50FAE98D-1BA9-4C5C-9B9D-02D05A67A03F}" type="datetime1">
               <a:rPr lang="es-ES" noProof="0" smtClean="0"/>
-              <a:t>07/10/2021</a:t>
+              <a:t>13/10/2021</a:t>
             </a:fld>
             <a:endParaRPr lang="es-ES" noProof="0" dirty="0"/>
           </a:p>
@@ -3258,7 +3258,7 @@
             <a:pPr rtl="0"/>
             <a:fld id="{50FAE98D-1BA9-4C5C-9B9D-02D05A67A03F}" type="datetime1">
               <a:rPr lang="es-ES" noProof="0" smtClean="0"/>
-              <a:t>07/10/2021</a:t>
+              <a:t>13/10/2021</a:t>
             </a:fld>
             <a:endParaRPr lang="es-ES" noProof="0" dirty="0"/>
           </a:p>
@@ -3820,23 +3820,7 @@
                   <a:schemeClr val="tx1"/>
                 </a:solidFill>
               </a:rPr>
-              <a:t>MODELO TCP/IP </a:t>
-            </a:r>
-            <a:r>
-              <a:rPr lang="es-ES" sz="4400" dirty="0" smtClean="0">
-                <a:solidFill>
-                  <a:schemeClr val="tx1"/>
-                </a:solidFill>
-              </a:rPr>
-              <a:t>Y </a:t>
-            </a:r>
-            <a:r>
-              <a:rPr lang="es-ES" sz="4400" dirty="0" smtClean="0">
-                <a:solidFill>
-                  <a:schemeClr val="tx1"/>
-                </a:solidFill>
-              </a:rPr>
-              <a:t>MODELO OSI</a:t>
+              <a:t>MODELO TCP/IP Y MODELO OSI</a:t>
             </a:r>
             <a:endParaRPr lang="eu-ES" sz="4400" dirty="0">
               <a:solidFill>
@@ -5293,15 +5277,7 @@
                   <a:schemeClr val="bg1"/>
                 </a:solidFill>
               </a:rPr>
-              <a:t>Protocolo </a:t>
-            </a:r>
-            <a:r>
-              <a:rPr lang="es-ES" dirty="0" smtClean="0">
-                <a:solidFill>
-                  <a:schemeClr val="bg1"/>
-                </a:solidFill>
-              </a:rPr>
-              <a:t>de control de transmisión</a:t>
+              <a:t>Protocolo de control de transmisión</a:t>
             </a:r>
           </a:p>
           <a:p>
@@ -5715,21 +5691,8 @@
                   <a:schemeClr val="bg1"/>
                 </a:solidFill>
               </a:rPr>
-              <a:t>Protocolo de </a:t>
-            </a:r>
-            <a:r>
-              <a:rPr lang="es-ES" dirty="0" smtClean="0">
-                <a:solidFill>
-                  <a:schemeClr val="bg1"/>
-                </a:solidFill>
-              </a:rPr>
-              <a:t>comunicación de datos digitales</a:t>
-            </a:r>
-            <a:endParaRPr lang="es-ES" dirty="0" smtClean="0">
-              <a:solidFill>
-                <a:schemeClr val="bg1"/>
-              </a:solidFill>
-            </a:endParaRPr>
+              <a:t>Protocolo de comunicación de datos digitales</a:t>
+            </a:r>
           </a:p>
           <a:p>
             <a:endParaRPr lang="es-ES" dirty="0">
@@ -8376,7 +8339,7 @@
         </p:nvSpPr>
         <p:spPr>
           <a:xfrm>
-            <a:off x="3013919" y="2123827"/>
+            <a:off x="3013916" y="3247958"/>
             <a:ext cx="8263991" cy="646331"/>
           </a:xfrm>
           <a:prstGeom prst="rect">
@@ -8409,7 +8372,7 @@
         </p:nvSpPr>
         <p:spPr>
           <a:xfrm>
-            <a:off x="3013919" y="3248832"/>
+            <a:off x="3013916" y="2120691"/>
             <a:ext cx="8263991" cy="646331"/>
           </a:xfrm>
           <a:prstGeom prst="rect">
@@ -8431,11 +8394,6 @@
               </a:rPr>
               <a:t>La Organización Internacional de Estandarización (ISO) hizo un modelo funcional</a:t>
             </a:r>
-            <a:endParaRPr lang="es-ES" dirty="0" smtClean="0">
-              <a:solidFill>
-                <a:schemeClr val="bg1"/>
-              </a:solidFill>
-            </a:endParaRPr>
           </a:p>
         </p:txBody>
       </p:sp>
@@ -8447,7 +8405,7 @@
         </p:nvSpPr>
         <p:spPr>
           <a:xfrm>
-            <a:off x="728122" y="4320495"/>
+            <a:off x="728122" y="4404259"/>
             <a:ext cx="1859224" cy="560921"/>
           </a:xfrm>
           <a:prstGeom prst="roundRect">
@@ -8507,7 +8465,7 @@
         </p:nvSpPr>
         <p:spPr>
           <a:xfrm>
-            <a:off x="3013919" y="4416289"/>
+            <a:off x="3013917" y="4500053"/>
             <a:ext cx="8263991" cy="369332"/>
           </a:xfrm>
           <a:prstGeom prst="rect">
@@ -8527,7 +8485,15 @@
                   <a:schemeClr val="bg1"/>
                 </a:solidFill>
               </a:rPr>
-              <a:t>Sin embargo, el modelo TCP/IP obtiene más popularidad al inicio</a:t>
+              <a:t>Sin embargo, el modelo TCP/IP obtiene más </a:t>
+            </a:r>
+            <a:r>
+              <a:rPr lang="es-ES" dirty="0" smtClean="0">
+                <a:solidFill>
+                  <a:schemeClr val="bg1"/>
+                </a:solidFill>
+              </a:rPr>
+              <a:t>popularidad</a:t>
             </a:r>
             <a:endParaRPr lang="es-ES" dirty="0" smtClean="0">
               <a:solidFill>
@@ -8545,7 +8511,7 @@
         </p:nvSpPr>
         <p:spPr>
           <a:xfrm>
-            <a:off x="728122" y="5308787"/>
+            <a:off x="728122" y="5526101"/>
             <a:ext cx="1859224" cy="560921"/>
           </a:xfrm>
           <a:prstGeom prst="roundRect">
@@ -8605,7 +8571,7 @@
         </p:nvSpPr>
         <p:spPr>
           <a:xfrm>
-            <a:off x="3013919" y="5404581"/>
+            <a:off x="3013918" y="5621895"/>
             <a:ext cx="8263991" cy="369332"/>
           </a:xfrm>
           <a:prstGeom prst="rect">
@@ -8627,11 +8593,6 @@
               </a:rPr>
               <a:t>Aún así, este modelo se utiliza en computación en la nube</a:t>
             </a:r>
-            <a:endParaRPr lang="es-ES" dirty="0" smtClean="0">
-              <a:solidFill>
-                <a:schemeClr val="bg1"/>
-              </a:solidFill>
-            </a:endParaRPr>
           </a:p>
         </p:txBody>
       </p:sp>
@@ -9621,14 +9582,6 @@
 </file>
 
 <file path=customXml/item2.xml><?xml version="1.0" encoding="utf-8"?>
-<p:properties xmlns:p="http://schemas.microsoft.com/office/2006/metadata/properties" xmlns:xsi="http://www.w3.org/2001/XMLSchema-instance" xmlns:pc="http://schemas.microsoft.com/office/infopath/2007/PartnerControls">
-  <documentManagement>
-    <MediaServiceKeyPoints xmlns="71af3243-3dd4-4a8d-8c0d-dd76da1f02a5" xsi:nil="true"/>
-  </documentManagement>
-</p:properties>
-</file>
-
-<file path=customXml/item3.xml><?xml version="1.0" encoding="utf-8"?>
 <ct:contentTypeSchema xmlns:ct="http://schemas.microsoft.com/office/2006/metadata/contentType" xmlns:ma="http://schemas.microsoft.com/office/2006/metadata/properties/metaAttributes" ct:_="" ma:_="" ma:contentTypeName="Document" ma:contentTypeID="0x01010079F111ED35F8CC479449609E8A0923A6" ma:contentTypeVersion="11" ma:contentTypeDescription="Create a new document." ma:contentTypeScope="" ma:versionID="9677210f24a1be23c92c90fd886aa0aa">
   <xsd:schema xmlns:xsd="http://www.w3.org/2001/XMLSchema" xmlns:xs="http://www.w3.org/2001/XMLSchema" xmlns:p="http://schemas.microsoft.com/office/2006/metadata/properties" xmlns:ns2="71af3243-3dd4-4a8d-8c0d-dd76da1f02a5" xmlns:ns3="16c05727-aa75-4e4a-9b5f-8a80a1165891" targetNamespace="http://schemas.microsoft.com/office/2006/metadata/properties" ma:root="true" ma:fieldsID="60e05723c5c1908df1a1a4ebf11d344e" ns2:_="" ns3:_="">
     <xsd:import namespace="71af3243-3dd4-4a8d-8c0d-dd76da1f02a5"/>
@@ -9839,6 +9792,14 @@
 </ct:contentTypeSchema>
 </file>
 
+<file path=customXml/item3.xml><?xml version="1.0" encoding="utf-8"?>
+<p:properties xmlns:p="http://schemas.microsoft.com/office/2006/metadata/properties" xmlns:xsi="http://www.w3.org/2001/XMLSchema-instance" xmlns:pc="http://schemas.microsoft.com/office/infopath/2007/PartnerControls">
+  <documentManagement>
+    <MediaServiceKeyPoints xmlns="71af3243-3dd4-4a8d-8c0d-dd76da1f02a5" xsi:nil="true"/>
+  </documentManagement>
+</p:properties>
+</file>
+
 <file path=customXml/itemProps1.xml><?xml version="1.0" encoding="utf-8"?>
 <ds:datastoreItem xmlns:ds="http://schemas.openxmlformats.org/officeDocument/2006/customXml" ds:itemID="{31E252AE-1687-4F4A-AAAD-EE8304DE9099}">
   <ds:schemaRefs>
@@ -9848,23 +9809,6 @@
 </file>
 
 <file path=customXml/itemProps2.xml><?xml version="1.0" encoding="utf-8"?>
-<ds:datastoreItem xmlns:ds="http://schemas.openxmlformats.org/officeDocument/2006/customXml" ds:itemID="{5E99C30C-D4EF-40A1-90A6-0C8077024112}">
-  <ds:schemaRefs>
-    <ds:schemaRef ds:uri="http://purl.org/dc/terms/"/>
-    <ds:schemaRef ds:uri="http://schemas.openxmlformats.org/package/2006/metadata/core-properties"/>
-    <ds:schemaRef ds:uri="16c05727-aa75-4e4a-9b5f-8a80a1165891"/>
-    <ds:schemaRef ds:uri="http://purl.org/dc/dcmitype/"/>
-    <ds:schemaRef ds:uri="http://schemas.microsoft.com/office/infopath/2007/PartnerControls"/>
-    <ds:schemaRef ds:uri="http://schemas.microsoft.com/office/2006/documentManagement/types"/>
-    <ds:schemaRef ds:uri="http://purl.org/dc/elements/1.1/"/>
-    <ds:schemaRef ds:uri="http://schemas.microsoft.com/office/2006/metadata/properties"/>
-    <ds:schemaRef ds:uri="71af3243-3dd4-4a8d-8c0d-dd76da1f02a5"/>
-    <ds:schemaRef ds:uri="http://www.w3.org/XML/1998/namespace"/>
-  </ds:schemaRefs>
-</ds:datastoreItem>
-</file>
-
-<file path=customXml/itemProps3.xml><?xml version="1.0" encoding="utf-8"?>
 <ds:datastoreItem xmlns:ds="http://schemas.openxmlformats.org/officeDocument/2006/customXml" ds:itemID="{ABA78EF8-E824-4C87-A4FF-3288A5E914CF}">
   <ds:schemaRefs>
     <ds:schemaRef ds:uri="http://schemas.microsoft.com/office/2006/metadata/contentType"/>
@@ -9881,4 +9825,21 @@
     <ds:schemaRef ds:uri="http://schemas.microsoft.com/internal/obd"/>
   </ds:schemaRefs>
 </ds:datastoreItem>
+</file>
+
+<file path=customXml/itemProps3.xml><?xml version="1.0" encoding="utf-8"?>
+<ds:datastoreItem xmlns:ds="http://schemas.openxmlformats.org/officeDocument/2006/customXml" ds:itemID="{5E99C30C-D4EF-40A1-90A6-0C8077024112}">
+  <ds:schemaRefs>
+    <ds:schemaRef ds:uri="http://purl.org/dc/terms/"/>
+    <ds:schemaRef ds:uri="http://schemas.openxmlformats.org/package/2006/metadata/core-properties"/>
+    <ds:schemaRef ds:uri="16c05727-aa75-4e4a-9b5f-8a80a1165891"/>
+    <ds:schemaRef ds:uri="http://purl.org/dc/dcmitype/"/>
+    <ds:schemaRef ds:uri="http://schemas.microsoft.com/office/infopath/2007/PartnerControls"/>
+    <ds:schemaRef ds:uri="http://schemas.microsoft.com/office/2006/documentManagement/types"/>
+    <ds:schemaRef ds:uri="http://purl.org/dc/elements/1.1/"/>
+    <ds:schemaRef ds:uri="http://schemas.microsoft.com/office/2006/metadata/properties"/>
+    <ds:schemaRef ds:uri="71af3243-3dd4-4a8d-8c0d-dd76da1f02a5"/>
+    <ds:schemaRef ds:uri="http://www.w3.org/XML/1998/namespace"/>
+  </ds:schemaRefs>
+</ds:datastoreItem>
 </file>
</xml_diff>